<commit_message>
changed time in timepoints
</commit_message>
<xml_diff>
--- a/presentations/1_LacombePetruso.pptx
+++ b/presentations/1_LacombePetruso.pptx
@@ -213,7 +213,7 @@
           <a:p>
             <a:fld id="{6ACCD18E-DBF1-4442-907D-5CC546A2FCC8}" type="datetimeFigureOut">
               <a:rPr lang="it-IT" smtClean="0"/>
-              <a:t>08/05/23</a:t>
+              <a:t>09/05/23</a:t>
             </a:fld>
             <a:endParaRPr lang="it-IT"/>
           </a:p>
@@ -795,7 +795,7 @@
           <a:p>
             <a:fld id="{656ABD56-F93A-B346-850C-5E944A54FBE8}" type="datetimeFigureOut">
               <a:rPr lang="it-IT" smtClean="0"/>
-              <a:t>08/05/23</a:t>
+              <a:t>09/05/23</a:t>
             </a:fld>
             <a:endParaRPr lang="it-IT"/>
           </a:p>
@@ -993,7 +993,7 @@
           <a:p>
             <a:fld id="{656ABD56-F93A-B346-850C-5E944A54FBE8}" type="datetimeFigureOut">
               <a:rPr lang="it-IT" smtClean="0"/>
-              <a:t>08/05/23</a:t>
+              <a:t>09/05/23</a:t>
             </a:fld>
             <a:endParaRPr lang="it-IT"/>
           </a:p>
@@ -1201,7 +1201,7 @@
           <a:p>
             <a:fld id="{656ABD56-F93A-B346-850C-5E944A54FBE8}" type="datetimeFigureOut">
               <a:rPr lang="it-IT" smtClean="0"/>
-              <a:t>08/05/23</a:t>
+              <a:t>09/05/23</a:t>
             </a:fld>
             <a:endParaRPr lang="it-IT"/>
           </a:p>
@@ -1399,7 +1399,7 @@
           <a:p>
             <a:fld id="{656ABD56-F93A-B346-850C-5E944A54FBE8}" type="datetimeFigureOut">
               <a:rPr lang="it-IT" smtClean="0"/>
-              <a:t>08/05/23</a:t>
+              <a:t>09/05/23</a:t>
             </a:fld>
             <a:endParaRPr lang="it-IT"/>
           </a:p>
@@ -1674,7 +1674,7 @@
           <a:p>
             <a:fld id="{656ABD56-F93A-B346-850C-5E944A54FBE8}" type="datetimeFigureOut">
               <a:rPr lang="it-IT" smtClean="0"/>
-              <a:t>08/05/23</a:t>
+              <a:t>09/05/23</a:t>
             </a:fld>
             <a:endParaRPr lang="it-IT"/>
           </a:p>
@@ -1939,7 +1939,7 @@
           <a:p>
             <a:fld id="{656ABD56-F93A-B346-850C-5E944A54FBE8}" type="datetimeFigureOut">
               <a:rPr lang="it-IT" smtClean="0"/>
-              <a:t>08/05/23</a:t>
+              <a:t>09/05/23</a:t>
             </a:fld>
             <a:endParaRPr lang="it-IT"/>
           </a:p>
@@ -2351,7 +2351,7 @@
           <a:p>
             <a:fld id="{656ABD56-F93A-B346-850C-5E944A54FBE8}" type="datetimeFigureOut">
               <a:rPr lang="it-IT" smtClean="0"/>
-              <a:t>08/05/23</a:t>
+              <a:t>09/05/23</a:t>
             </a:fld>
             <a:endParaRPr lang="it-IT"/>
           </a:p>
@@ -2492,7 +2492,7 @@
           <a:p>
             <a:fld id="{656ABD56-F93A-B346-850C-5E944A54FBE8}" type="datetimeFigureOut">
               <a:rPr lang="it-IT" smtClean="0"/>
-              <a:t>08/05/23</a:t>
+              <a:t>09/05/23</a:t>
             </a:fld>
             <a:endParaRPr lang="it-IT"/>
           </a:p>
@@ -2605,7 +2605,7 @@
           <a:p>
             <a:fld id="{656ABD56-F93A-B346-850C-5E944A54FBE8}" type="datetimeFigureOut">
               <a:rPr lang="it-IT" smtClean="0"/>
-              <a:t>08/05/23</a:t>
+              <a:t>09/05/23</a:t>
             </a:fld>
             <a:endParaRPr lang="it-IT"/>
           </a:p>
@@ -2916,7 +2916,7 @@
           <a:p>
             <a:fld id="{656ABD56-F93A-B346-850C-5E944A54FBE8}" type="datetimeFigureOut">
               <a:rPr lang="it-IT" smtClean="0"/>
-              <a:t>08/05/23</a:t>
+              <a:t>09/05/23</a:t>
             </a:fld>
             <a:endParaRPr lang="it-IT"/>
           </a:p>
@@ -3204,7 +3204,7 @@
           <a:p>
             <a:fld id="{656ABD56-F93A-B346-850C-5E944A54FBE8}" type="datetimeFigureOut">
               <a:rPr lang="it-IT" smtClean="0"/>
-              <a:t>08/05/23</a:t>
+              <a:t>09/05/23</a:t>
             </a:fld>
             <a:endParaRPr lang="it-IT"/>
           </a:p>
@@ -3445,7 +3445,7 @@
           <a:p>
             <a:fld id="{656ABD56-F93A-B346-850C-5E944A54FBE8}" type="datetimeFigureOut">
               <a:rPr lang="it-IT" smtClean="0"/>
-              <a:t>08/05/23</a:t>
+              <a:t>09/05/23</a:t>
             </a:fld>
             <a:endParaRPr lang="it-IT"/>
           </a:p>
@@ -6099,8 +6099,8 @@
         </p:nvSpPr>
         <p:spPr>
           <a:xfrm>
-            <a:off x="2264853" y="865048"/>
-            <a:ext cx="9786469" cy="5350696"/>
+            <a:off x="2090057" y="865048"/>
+            <a:ext cx="10101943" cy="5350696"/>
           </a:xfrm>
           <a:prstGeom prst="rect">
             <a:avLst/>
@@ -6176,7 +6176,7 @@
                 <a:cs typeface="Gill Sans Light" panose="020B0302020104020203" pitchFamily="34" charset="-79"/>
                 <a:sym typeface="Fira Sans Extra Condensed Medium"/>
               </a:rPr>
-              <a:t>(total, male, female) for 7 years </a:t>
+              <a:t>(total, male, female) for 7 timepoints </a:t>
             </a:r>
           </a:p>
           <a:p>
@@ -6203,7 +6203,7 @@
                 <a:cs typeface="Gill Sans Light" panose="020B0302020104020203" pitchFamily="34" charset="-79"/>
                 <a:sym typeface="Fira Sans Extra Condensed Medium"/>
               </a:rPr>
-              <a:t>for 6 years:</a:t>
+              <a:t>for 6 timepoints:</a:t>
             </a:r>
           </a:p>
           <a:p>
@@ -6568,7 +6568,7 @@
         </p:blipFill>
         <p:spPr>
           <a:xfrm>
-            <a:off x="2824339" y="1496374"/>
+            <a:off x="2621139" y="1525402"/>
             <a:ext cx="196069" cy="330367"/>
           </a:xfrm>
           <a:prstGeom prst="rect">
@@ -6597,7 +6597,7 @@
         </p:blipFill>
         <p:spPr>
           <a:xfrm>
-            <a:off x="2818033" y="1956125"/>
+            <a:off x="2614833" y="1985153"/>
             <a:ext cx="196069" cy="330367"/>
           </a:xfrm>
           <a:prstGeom prst="rect">
@@ -6626,7 +6626,7 @@
         </p:blipFill>
         <p:spPr>
           <a:xfrm>
-            <a:off x="2821876" y="5216974"/>
+            <a:off x="2618676" y="5216974"/>
             <a:ext cx="196069" cy="330367"/>
           </a:xfrm>
           <a:prstGeom prst="rect">
@@ -6655,7 +6655,7 @@
         </p:blipFill>
         <p:spPr>
           <a:xfrm>
-            <a:off x="2815570" y="5702125"/>
+            <a:off x="2612370" y="5702125"/>
             <a:ext cx="196069" cy="330367"/>
           </a:xfrm>
           <a:prstGeom prst="rect">

</xml_diff>